<commit_message>
add web audio (for touch)
</commit_message>
<xml_diff>
--- a/touch/touch.pptx
+++ b/touch/touch.pptx
@@ -108,6 +108,11 @@
       </a:defRPr>
     </a:lvl9pPr>
   </p:defaultTextStyle>
+  <p:extLst>
+    <p:ext uri="{EFAFB233-063F-42B5-8137-9DF3F51BA10A}">
+      <p15:sldGuideLst xmlns:p15="http://schemas.microsoft.com/office/powerpoint/2012/main"/>
+    </p:ext>
+  </p:extLst>
 </p:presentation>
 </file>
 
@@ -3184,8 +3189,20 @@
             </a:r>
             <a:r>
               <a:rPr lang="en-US" altLang="zh-TW" dirty="0" smtClean="0"/>
-              <a:t> works?</a:t>
-            </a:r>
+              <a:t> works</a:t>
+            </a:r>
+            <a:r>
+              <a:rPr lang="en-US" altLang="zh-TW" dirty="0" smtClean="0"/>
+              <a:t>?</a:t>
+            </a:r>
+          </a:p>
+          <a:p>
+            <a:pPr lvl="1"/>
+            <a:r>
+              <a:rPr lang="en-US" altLang="zh-TW" smtClean="0"/>
+              <a:t>Yes (25int)</a:t>
+            </a:r>
+            <a:endParaRPr lang="en-US" altLang="zh-TW" dirty="0" smtClean="0"/>
           </a:p>
           <a:p>
             <a:r>

</xml_diff>